<commit_message>
Another update of the validation results
</commit_message>
<xml_diff>
--- a/figures/Figure1.pptx
+++ b/figures/Figure1.pptx
@@ -256,7 +256,7 @@
           <a:p>
             <a:fld id="{A1834766-88F6-411A-AB82-D167DC2E77CF}" type="datetimeFigureOut">
               <a:rPr lang="en-GB" smtClean="0"/>
-              <a:t>29/03/2023</a:t>
+              <a:t>31/03/2023</a:t>
             </a:fld>
             <a:endParaRPr lang="en-GB"/>
           </a:p>
@@ -426,7 +426,7 @@
           <a:p>
             <a:fld id="{A1834766-88F6-411A-AB82-D167DC2E77CF}" type="datetimeFigureOut">
               <a:rPr lang="en-GB" smtClean="0"/>
-              <a:t>29/03/2023</a:t>
+              <a:t>31/03/2023</a:t>
             </a:fld>
             <a:endParaRPr lang="en-GB"/>
           </a:p>
@@ -606,7 +606,7 @@
           <a:p>
             <a:fld id="{A1834766-88F6-411A-AB82-D167DC2E77CF}" type="datetimeFigureOut">
               <a:rPr lang="en-GB" smtClean="0"/>
-              <a:t>29/03/2023</a:t>
+              <a:t>31/03/2023</a:t>
             </a:fld>
             <a:endParaRPr lang="en-GB"/>
           </a:p>
@@ -776,7 +776,7 @@
           <a:p>
             <a:fld id="{A1834766-88F6-411A-AB82-D167DC2E77CF}" type="datetimeFigureOut">
               <a:rPr lang="en-GB" smtClean="0"/>
-              <a:t>29/03/2023</a:t>
+              <a:t>31/03/2023</a:t>
             </a:fld>
             <a:endParaRPr lang="en-GB"/>
           </a:p>
@@ -1020,7 +1020,7 @@
           <a:p>
             <a:fld id="{A1834766-88F6-411A-AB82-D167DC2E77CF}" type="datetimeFigureOut">
               <a:rPr lang="en-GB" smtClean="0"/>
-              <a:t>29/03/2023</a:t>
+              <a:t>31/03/2023</a:t>
             </a:fld>
             <a:endParaRPr lang="en-GB"/>
           </a:p>
@@ -1252,7 +1252,7 @@
           <a:p>
             <a:fld id="{A1834766-88F6-411A-AB82-D167DC2E77CF}" type="datetimeFigureOut">
               <a:rPr lang="en-GB" smtClean="0"/>
-              <a:t>29/03/2023</a:t>
+              <a:t>31/03/2023</a:t>
             </a:fld>
             <a:endParaRPr lang="en-GB"/>
           </a:p>
@@ -1619,7 +1619,7 @@
           <a:p>
             <a:fld id="{A1834766-88F6-411A-AB82-D167DC2E77CF}" type="datetimeFigureOut">
               <a:rPr lang="en-GB" smtClean="0"/>
-              <a:t>29/03/2023</a:t>
+              <a:t>31/03/2023</a:t>
             </a:fld>
             <a:endParaRPr lang="en-GB"/>
           </a:p>
@@ -1737,7 +1737,7 @@
           <a:p>
             <a:fld id="{A1834766-88F6-411A-AB82-D167DC2E77CF}" type="datetimeFigureOut">
               <a:rPr lang="en-GB" smtClean="0"/>
-              <a:t>29/03/2023</a:t>
+              <a:t>31/03/2023</a:t>
             </a:fld>
             <a:endParaRPr lang="en-GB"/>
           </a:p>
@@ -1832,7 +1832,7 @@
           <a:p>
             <a:fld id="{A1834766-88F6-411A-AB82-D167DC2E77CF}" type="datetimeFigureOut">
               <a:rPr lang="en-GB" smtClean="0"/>
-              <a:t>29/03/2023</a:t>
+              <a:t>31/03/2023</a:t>
             </a:fld>
             <a:endParaRPr lang="en-GB"/>
           </a:p>
@@ -2109,7 +2109,7 @@
           <a:p>
             <a:fld id="{A1834766-88F6-411A-AB82-D167DC2E77CF}" type="datetimeFigureOut">
               <a:rPr lang="en-GB" smtClean="0"/>
-              <a:t>29/03/2023</a:t>
+              <a:t>31/03/2023</a:t>
             </a:fld>
             <a:endParaRPr lang="en-GB"/>
           </a:p>
@@ -2366,7 +2366,7 @@
           <a:p>
             <a:fld id="{A1834766-88F6-411A-AB82-D167DC2E77CF}" type="datetimeFigureOut">
               <a:rPr lang="en-GB" smtClean="0"/>
-              <a:t>29/03/2023</a:t>
+              <a:t>31/03/2023</a:t>
             </a:fld>
             <a:endParaRPr lang="en-GB"/>
           </a:p>
@@ -2579,7 +2579,7 @@
           <a:p>
             <a:fld id="{A1834766-88F6-411A-AB82-D167DC2E77CF}" type="datetimeFigureOut">
               <a:rPr lang="en-GB" smtClean="0"/>
-              <a:t>29/03/2023</a:t>
+              <a:t>31/03/2023</a:t>
             </a:fld>
             <a:endParaRPr lang="en-GB"/>
           </a:p>
@@ -3690,7 +3690,7 @@
         </p:nvSpPr>
         <p:spPr>
           <a:xfrm>
-            <a:off x="9280931" y="0"/>
+            <a:off x="9980172" y="14288"/>
             <a:ext cx="665018" cy="523220"/>
           </a:xfrm>
           <a:prstGeom prst="rect">
@@ -3729,7 +3729,7 @@
         </p:nvSpPr>
         <p:spPr>
           <a:xfrm>
-            <a:off x="9520518" y="15941"/>
+            <a:off x="9269896" y="45893"/>
             <a:ext cx="3590364" cy="1015663"/>
           </a:xfrm>
           <a:prstGeom prst="rect">
@@ -3782,7 +3782,7 @@
         </p:blipFill>
         <p:spPr>
           <a:xfrm>
-            <a:off x="10794702" y="1047540"/>
+            <a:off x="10645190" y="1107444"/>
             <a:ext cx="2132024" cy="8365389"/>
           </a:xfrm>
           <a:prstGeom prst="rect">

</xml_diff>

<commit_message>
Updated files for public release
</commit_message>
<xml_diff>
--- a/figures/Figure1.pptx
+++ b/figures/Figure1.pptx
@@ -256,7 +256,7 @@
           <a:p>
             <a:fld id="{A1834766-88F6-411A-AB82-D167DC2E77CF}" type="datetimeFigureOut">
               <a:rPr lang="en-GB" smtClean="0"/>
-              <a:t>31/03/2023</a:t>
+              <a:t>28/06/2023</a:t>
             </a:fld>
             <a:endParaRPr lang="en-GB"/>
           </a:p>
@@ -426,7 +426,7 @@
           <a:p>
             <a:fld id="{A1834766-88F6-411A-AB82-D167DC2E77CF}" type="datetimeFigureOut">
               <a:rPr lang="en-GB" smtClean="0"/>
-              <a:t>31/03/2023</a:t>
+              <a:t>28/06/2023</a:t>
             </a:fld>
             <a:endParaRPr lang="en-GB"/>
           </a:p>
@@ -606,7 +606,7 @@
           <a:p>
             <a:fld id="{A1834766-88F6-411A-AB82-D167DC2E77CF}" type="datetimeFigureOut">
               <a:rPr lang="en-GB" smtClean="0"/>
-              <a:t>31/03/2023</a:t>
+              <a:t>28/06/2023</a:t>
             </a:fld>
             <a:endParaRPr lang="en-GB"/>
           </a:p>
@@ -776,7 +776,7 @@
           <a:p>
             <a:fld id="{A1834766-88F6-411A-AB82-D167DC2E77CF}" type="datetimeFigureOut">
               <a:rPr lang="en-GB" smtClean="0"/>
-              <a:t>31/03/2023</a:t>
+              <a:t>28/06/2023</a:t>
             </a:fld>
             <a:endParaRPr lang="en-GB"/>
           </a:p>
@@ -1020,7 +1020,7 @@
           <a:p>
             <a:fld id="{A1834766-88F6-411A-AB82-D167DC2E77CF}" type="datetimeFigureOut">
               <a:rPr lang="en-GB" smtClean="0"/>
-              <a:t>31/03/2023</a:t>
+              <a:t>28/06/2023</a:t>
             </a:fld>
             <a:endParaRPr lang="en-GB"/>
           </a:p>
@@ -1252,7 +1252,7 @@
           <a:p>
             <a:fld id="{A1834766-88F6-411A-AB82-D167DC2E77CF}" type="datetimeFigureOut">
               <a:rPr lang="en-GB" smtClean="0"/>
-              <a:t>31/03/2023</a:t>
+              <a:t>28/06/2023</a:t>
             </a:fld>
             <a:endParaRPr lang="en-GB"/>
           </a:p>
@@ -1619,7 +1619,7 @@
           <a:p>
             <a:fld id="{A1834766-88F6-411A-AB82-D167DC2E77CF}" type="datetimeFigureOut">
               <a:rPr lang="en-GB" smtClean="0"/>
-              <a:t>31/03/2023</a:t>
+              <a:t>28/06/2023</a:t>
             </a:fld>
             <a:endParaRPr lang="en-GB"/>
           </a:p>
@@ -1737,7 +1737,7 @@
           <a:p>
             <a:fld id="{A1834766-88F6-411A-AB82-D167DC2E77CF}" type="datetimeFigureOut">
               <a:rPr lang="en-GB" smtClean="0"/>
-              <a:t>31/03/2023</a:t>
+              <a:t>28/06/2023</a:t>
             </a:fld>
             <a:endParaRPr lang="en-GB"/>
           </a:p>
@@ -1832,7 +1832,7 @@
           <a:p>
             <a:fld id="{A1834766-88F6-411A-AB82-D167DC2E77CF}" type="datetimeFigureOut">
               <a:rPr lang="en-GB" smtClean="0"/>
-              <a:t>31/03/2023</a:t>
+              <a:t>28/06/2023</a:t>
             </a:fld>
             <a:endParaRPr lang="en-GB"/>
           </a:p>
@@ -2109,7 +2109,7 @@
           <a:p>
             <a:fld id="{A1834766-88F6-411A-AB82-D167DC2E77CF}" type="datetimeFigureOut">
               <a:rPr lang="en-GB" smtClean="0"/>
-              <a:t>31/03/2023</a:t>
+              <a:t>28/06/2023</a:t>
             </a:fld>
             <a:endParaRPr lang="en-GB"/>
           </a:p>
@@ -2366,7 +2366,7 @@
           <a:p>
             <a:fld id="{A1834766-88F6-411A-AB82-D167DC2E77CF}" type="datetimeFigureOut">
               <a:rPr lang="en-GB" smtClean="0"/>
-              <a:t>31/03/2023</a:t>
+              <a:t>28/06/2023</a:t>
             </a:fld>
             <a:endParaRPr lang="en-GB"/>
           </a:p>
@@ -2579,7 +2579,7 @@
           <a:p>
             <a:fld id="{A1834766-88F6-411A-AB82-D167DC2E77CF}" type="datetimeFigureOut">
               <a:rPr lang="en-GB" smtClean="0"/>
-              <a:t>31/03/2023</a:t>
+              <a:t>28/06/2023</a:t>
             </a:fld>
             <a:endParaRPr lang="en-GB"/>
           </a:p>

</xml_diff>